<commit_message>
Done with RNA-targeting nucleases
</commit_message>
<xml_diff>
--- a/inst/slides/classes.pptx
+++ b/inst/slides/classes.pptx
@@ -249,7 +249,7 @@
           <a:p>
             <a:fld id="{DD6D9246-4FED-8E4D-BC9B-CDD794F2A5B7}" type="datetimeFigureOut">
               <a:rPr lang="en-US" smtClean="0"/>
-              <a:t>4/21/21</a:t>
+              <a:t>12/22/21</a:t>
             </a:fld>
             <a:endParaRPr lang="en-US"/>
           </a:p>
@@ -419,7 +419,7 @@
           <a:p>
             <a:fld id="{DD6D9246-4FED-8E4D-BC9B-CDD794F2A5B7}" type="datetimeFigureOut">
               <a:rPr lang="en-US" smtClean="0"/>
-              <a:t>4/21/21</a:t>
+              <a:t>12/22/21</a:t>
             </a:fld>
             <a:endParaRPr lang="en-US"/>
           </a:p>
@@ -599,7 +599,7 @@
           <a:p>
             <a:fld id="{DD6D9246-4FED-8E4D-BC9B-CDD794F2A5B7}" type="datetimeFigureOut">
               <a:rPr lang="en-US" smtClean="0"/>
-              <a:t>4/21/21</a:t>
+              <a:t>12/22/21</a:t>
             </a:fld>
             <a:endParaRPr lang="en-US"/>
           </a:p>
@@ -769,7 +769,7 @@
           <a:p>
             <a:fld id="{DD6D9246-4FED-8E4D-BC9B-CDD794F2A5B7}" type="datetimeFigureOut">
               <a:rPr lang="en-US" smtClean="0"/>
-              <a:t>4/21/21</a:t>
+              <a:t>12/22/21</a:t>
             </a:fld>
             <a:endParaRPr lang="en-US"/>
           </a:p>
@@ -1013,7 +1013,7 @@
           <a:p>
             <a:fld id="{DD6D9246-4FED-8E4D-BC9B-CDD794F2A5B7}" type="datetimeFigureOut">
               <a:rPr lang="en-US" smtClean="0"/>
-              <a:t>4/21/21</a:t>
+              <a:t>12/22/21</a:t>
             </a:fld>
             <a:endParaRPr lang="en-US"/>
           </a:p>
@@ -1245,7 +1245,7 @@
           <a:p>
             <a:fld id="{DD6D9246-4FED-8E4D-BC9B-CDD794F2A5B7}" type="datetimeFigureOut">
               <a:rPr lang="en-US" smtClean="0"/>
-              <a:t>4/21/21</a:t>
+              <a:t>12/22/21</a:t>
             </a:fld>
             <a:endParaRPr lang="en-US"/>
           </a:p>
@@ -1612,7 +1612,7 @@
           <a:p>
             <a:fld id="{DD6D9246-4FED-8E4D-BC9B-CDD794F2A5B7}" type="datetimeFigureOut">
               <a:rPr lang="en-US" smtClean="0"/>
-              <a:t>4/21/21</a:t>
+              <a:t>12/22/21</a:t>
             </a:fld>
             <a:endParaRPr lang="en-US"/>
           </a:p>
@@ -1730,7 +1730,7 @@
           <a:p>
             <a:fld id="{DD6D9246-4FED-8E4D-BC9B-CDD794F2A5B7}" type="datetimeFigureOut">
               <a:rPr lang="en-US" smtClean="0"/>
-              <a:t>4/21/21</a:t>
+              <a:t>12/22/21</a:t>
             </a:fld>
             <a:endParaRPr lang="en-US"/>
           </a:p>
@@ -1825,7 +1825,7 @@
           <a:p>
             <a:fld id="{DD6D9246-4FED-8E4D-BC9B-CDD794F2A5B7}" type="datetimeFigureOut">
               <a:rPr lang="en-US" smtClean="0"/>
-              <a:t>4/21/21</a:t>
+              <a:t>12/22/21</a:t>
             </a:fld>
             <a:endParaRPr lang="en-US"/>
           </a:p>
@@ -2102,7 +2102,7 @@
           <a:p>
             <a:fld id="{DD6D9246-4FED-8E4D-BC9B-CDD794F2A5B7}" type="datetimeFigureOut">
               <a:rPr lang="en-US" smtClean="0"/>
-              <a:t>4/21/21</a:t>
+              <a:t>12/22/21</a:t>
             </a:fld>
             <a:endParaRPr lang="en-US"/>
           </a:p>
@@ -2359,7 +2359,7 @@
           <a:p>
             <a:fld id="{DD6D9246-4FED-8E4D-BC9B-CDD794F2A5B7}" type="datetimeFigureOut">
               <a:rPr lang="en-US" smtClean="0"/>
-              <a:t>4/21/21</a:t>
+              <a:t>12/22/21</a:t>
             </a:fld>
             <a:endParaRPr lang="en-US"/>
           </a:p>
@@ -2572,7 +2572,7 @@
           <a:p>
             <a:fld id="{DD6D9246-4FED-8E4D-BC9B-CDD794F2A5B7}" type="datetimeFigureOut">
               <a:rPr lang="en-US" smtClean="0"/>
-              <a:t>4/21/21</a:t>
+              <a:t>12/22/21</a:t>
             </a:fld>
             <a:endParaRPr lang="en-US"/>
           </a:p>
@@ -8249,8 +8249,7 @@
               <a:rPr lang="en-US" sz="2667" dirty="0">
                 <a:solidFill>
                   <a:schemeClr val="accent4">
-                    <a:lumMod val="60000"/>
-                    <a:lumOff val="40000"/>
+                    <a:lumMod val="75000"/>
                   </a:schemeClr>
                 </a:solidFill>
                 <a:latin typeface="Courier" pitchFamily="2" charset="0"/>

</xml_diff>

<commit_message>
Doing work on base editor
</commit_message>
<xml_diff>
--- a/inst/slides/classes.pptx
+++ b/inst/slides/classes.pptx
@@ -249,7 +249,7 @@
           <a:p>
             <a:fld id="{DD6D9246-4FED-8E4D-BC9B-CDD794F2A5B7}" type="datetimeFigureOut">
               <a:rPr lang="en-US" smtClean="0"/>
-              <a:t>12/22/21</a:t>
+              <a:t>1/2/22</a:t>
             </a:fld>
             <a:endParaRPr lang="en-US"/>
           </a:p>
@@ -419,7 +419,7 @@
           <a:p>
             <a:fld id="{DD6D9246-4FED-8E4D-BC9B-CDD794F2A5B7}" type="datetimeFigureOut">
               <a:rPr lang="en-US" smtClean="0"/>
-              <a:t>12/22/21</a:t>
+              <a:t>1/2/22</a:t>
             </a:fld>
             <a:endParaRPr lang="en-US"/>
           </a:p>
@@ -599,7 +599,7 @@
           <a:p>
             <a:fld id="{DD6D9246-4FED-8E4D-BC9B-CDD794F2A5B7}" type="datetimeFigureOut">
               <a:rPr lang="en-US" smtClean="0"/>
-              <a:t>12/22/21</a:t>
+              <a:t>1/2/22</a:t>
             </a:fld>
             <a:endParaRPr lang="en-US"/>
           </a:p>
@@ -769,7 +769,7 @@
           <a:p>
             <a:fld id="{DD6D9246-4FED-8E4D-BC9B-CDD794F2A5B7}" type="datetimeFigureOut">
               <a:rPr lang="en-US" smtClean="0"/>
-              <a:t>12/22/21</a:t>
+              <a:t>1/2/22</a:t>
             </a:fld>
             <a:endParaRPr lang="en-US"/>
           </a:p>
@@ -1013,7 +1013,7 @@
           <a:p>
             <a:fld id="{DD6D9246-4FED-8E4D-BC9B-CDD794F2A5B7}" type="datetimeFigureOut">
               <a:rPr lang="en-US" smtClean="0"/>
-              <a:t>12/22/21</a:t>
+              <a:t>1/2/22</a:t>
             </a:fld>
             <a:endParaRPr lang="en-US"/>
           </a:p>
@@ -1245,7 +1245,7 @@
           <a:p>
             <a:fld id="{DD6D9246-4FED-8E4D-BC9B-CDD794F2A5B7}" type="datetimeFigureOut">
               <a:rPr lang="en-US" smtClean="0"/>
-              <a:t>12/22/21</a:t>
+              <a:t>1/2/22</a:t>
             </a:fld>
             <a:endParaRPr lang="en-US"/>
           </a:p>
@@ -1612,7 +1612,7 @@
           <a:p>
             <a:fld id="{DD6D9246-4FED-8E4D-BC9B-CDD794F2A5B7}" type="datetimeFigureOut">
               <a:rPr lang="en-US" smtClean="0"/>
-              <a:t>12/22/21</a:t>
+              <a:t>1/2/22</a:t>
             </a:fld>
             <a:endParaRPr lang="en-US"/>
           </a:p>
@@ -1730,7 +1730,7 @@
           <a:p>
             <a:fld id="{DD6D9246-4FED-8E4D-BC9B-CDD794F2A5B7}" type="datetimeFigureOut">
               <a:rPr lang="en-US" smtClean="0"/>
-              <a:t>12/22/21</a:t>
+              <a:t>1/2/22</a:t>
             </a:fld>
             <a:endParaRPr lang="en-US"/>
           </a:p>
@@ -1825,7 +1825,7 @@
           <a:p>
             <a:fld id="{DD6D9246-4FED-8E4D-BC9B-CDD794F2A5B7}" type="datetimeFigureOut">
               <a:rPr lang="en-US" smtClean="0"/>
-              <a:t>12/22/21</a:t>
+              <a:t>1/2/22</a:t>
             </a:fld>
             <a:endParaRPr lang="en-US"/>
           </a:p>
@@ -2102,7 +2102,7 @@
           <a:p>
             <a:fld id="{DD6D9246-4FED-8E4D-BC9B-CDD794F2A5B7}" type="datetimeFigureOut">
               <a:rPr lang="en-US" smtClean="0"/>
-              <a:t>12/22/21</a:t>
+              <a:t>1/2/22</a:t>
             </a:fld>
             <a:endParaRPr lang="en-US"/>
           </a:p>
@@ -2359,7 +2359,7 @@
           <a:p>
             <a:fld id="{DD6D9246-4FED-8E4D-BC9B-CDD794F2A5B7}" type="datetimeFigureOut">
               <a:rPr lang="en-US" smtClean="0"/>
-              <a:t>12/22/21</a:t>
+              <a:t>1/2/22</a:t>
             </a:fld>
             <a:endParaRPr lang="en-US"/>
           </a:p>
@@ -2572,7 +2572,7 @@
           <a:p>
             <a:fld id="{DD6D9246-4FED-8E4D-BC9B-CDD794F2A5B7}" type="datetimeFigureOut">
               <a:rPr lang="en-US" smtClean="0"/>
-              <a:t>12/22/21</a:t>
+              <a:t>1/2/22</a:t>
             </a:fld>
             <a:endParaRPr lang="en-US"/>
           </a:p>

</xml_diff>